<commit_message>
better ray traces and strehls
</commit_message>
<xml_diff>
--- a/editing_images/rays_and_strehls.pptx
+++ b/editing_images/rays_and_strehls.pptx
@@ -6,8 +6,7 @@
   </p:sldMasterIdLst>
   <p:sldIdLst>
     <p:sldId id="257" r:id="rId2"/>
-    <p:sldId id="258" r:id="rId3"/>
-    <p:sldId id="259" r:id="rId4"/>
+    <p:sldId id="260" r:id="rId3"/>
   </p:sldIdLst>
   <p:sldSz cx="9144000" cy="5143500" type="screen16x9"/>
   <p:notesSz cx="6858000" cy="9144000"/>
@@ -112,8 +111,7 @@
         <p14:section name="Untitled Section" id="{B853C4BA-7A76-4253-B4AF-A2761133C920}">
           <p14:sldIdLst>
             <p14:sldId id="257"/>
-            <p14:sldId id="258"/>
-            <p14:sldId id="259"/>
+            <p14:sldId id="260"/>
           </p14:sldIdLst>
         </p14:section>
       </p14:sectionLst>
@@ -303,7 +301,7 @@
           <a:p>
             <a:fld id="{DA1758D5-137F-4DB5-9D29-8DD7A04F891C}" type="datetimeFigureOut">
               <a:rPr lang="en-US" smtClean="0"/>
-              <a:t>5/10/2018</a:t>
+              <a:t>5/14/2018</a:t>
             </a:fld>
             <a:endParaRPr lang="en-US"/>
           </a:p>
@@ -473,7 +471,7 @@
           <a:p>
             <a:fld id="{DA1758D5-137F-4DB5-9D29-8DD7A04F891C}" type="datetimeFigureOut">
               <a:rPr lang="en-US" smtClean="0"/>
-              <a:t>5/10/2018</a:t>
+              <a:t>5/14/2018</a:t>
             </a:fld>
             <a:endParaRPr lang="en-US"/>
           </a:p>
@@ -653,7 +651,7 @@
           <a:p>
             <a:fld id="{DA1758D5-137F-4DB5-9D29-8DD7A04F891C}" type="datetimeFigureOut">
               <a:rPr lang="en-US" smtClean="0"/>
-              <a:t>5/10/2018</a:t>
+              <a:t>5/14/2018</a:t>
             </a:fld>
             <a:endParaRPr lang="en-US"/>
           </a:p>
@@ -823,7 +821,7 @@
           <a:p>
             <a:fld id="{DA1758D5-137F-4DB5-9D29-8DD7A04F891C}" type="datetimeFigureOut">
               <a:rPr lang="en-US" smtClean="0"/>
-              <a:t>5/10/2018</a:t>
+              <a:t>5/14/2018</a:t>
             </a:fld>
             <a:endParaRPr lang="en-US"/>
           </a:p>
@@ -1069,7 +1067,7 @@
           <a:p>
             <a:fld id="{DA1758D5-137F-4DB5-9D29-8DD7A04F891C}" type="datetimeFigureOut">
               <a:rPr lang="en-US" smtClean="0"/>
-              <a:t>5/10/2018</a:t>
+              <a:t>5/14/2018</a:t>
             </a:fld>
             <a:endParaRPr lang="en-US"/>
           </a:p>
@@ -1357,7 +1355,7 @@
           <a:p>
             <a:fld id="{DA1758D5-137F-4DB5-9D29-8DD7A04F891C}" type="datetimeFigureOut">
               <a:rPr lang="en-US" smtClean="0"/>
-              <a:t>5/10/2018</a:t>
+              <a:t>5/14/2018</a:t>
             </a:fld>
             <a:endParaRPr lang="en-US"/>
           </a:p>
@@ -1779,7 +1777,7 @@
           <a:p>
             <a:fld id="{DA1758D5-137F-4DB5-9D29-8DD7A04F891C}" type="datetimeFigureOut">
               <a:rPr lang="en-US" smtClean="0"/>
-              <a:t>5/10/2018</a:t>
+              <a:t>5/14/2018</a:t>
             </a:fld>
             <a:endParaRPr lang="en-US"/>
           </a:p>
@@ -1897,7 +1895,7 @@
           <a:p>
             <a:fld id="{DA1758D5-137F-4DB5-9D29-8DD7A04F891C}" type="datetimeFigureOut">
               <a:rPr lang="en-US" smtClean="0"/>
-              <a:t>5/10/2018</a:t>
+              <a:t>5/14/2018</a:t>
             </a:fld>
             <a:endParaRPr lang="en-US"/>
           </a:p>
@@ -1992,7 +1990,7 @@
           <a:p>
             <a:fld id="{DA1758D5-137F-4DB5-9D29-8DD7A04F891C}" type="datetimeFigureOut">
               <a:rPr lang="en-US" smtClean="0"/>
-              <a:t>5/10/2018</a:t>
+              <a:t>5/14/2018</a:t>
             </a:fld>
             <a:endParaRPr lang="en-US"/>
           </a:p>
@@ -2269,7 +2267,7 @@
           <a:p>
             <a:fld id="{DA1758D5-137F-4DB5-9D29-8DD7A04F891C}" type="datetimeFigureOut">
               <a:rPr lang="en-US" smtClean="0"/>
-              <a:t>5/10/2018</a:t>
+              <a:t>5/14/2018</a:t>
             </a:fld>
             <a:endParaRPr lang="en-US"/>
           </a:p>
@@ -2522,7 +2520,7 @@
           <a:p>
             <a:fld id="{DA1758D5-137F-4DB5-9D29-8DD7A04F891C}" type="datetimeFigureOut">
               <a:rPr lang="en-US" smtClean="0"/>
-              <a:t>5/10/2018</a:t>
+              <a:t>5/14/2018</a:t>
             </a:fld>
             <a:endParaRPr lang="en-US"/>
           </a:p>
@@ -2735,7 +2733,7 @@
           <a:p>
             <a:fld id="{DA1758D5-137F-4DB5-9D29-8DD7A04F891C}" type="datetimeFigureOut">
               <a:rPr lang="en-US" smtClean="0"/>
-              <a:t>5/10/2018</a:t>
+              <a:t>5/14/2018</a:t>
             </a:fld>
             <a:endParaRPr lang="en-US"/>
           </a:p>
@@ -3110,381 +3108,395 @@
           <a:chExt cx="0" cy="0"/>
         </a:xfrm>
       </p:grpSpPr>
-      <p:pic>
-        <p:nvPicPr>
-          <p:cNvPr id="1026" name="Picture 2" descr="Z:\Documents\CMB-Probe\SPIE_June2018\optics_paper\zrn_rays_45cmY.png"/>
-          <p:cNvPicPr>
-            <a:picLocks noChangeAspect="1" noChangeArrowheads="1"/>
-          </p:cNvPicPr>
+      <p:grpSp>
+        <p:nvGrpSpPr>
+          <p:cNvPr id="6" name="Group 5"/>
+          <p:cNvGrpSpPr/>
           <p:nvPr/>
-        </p:nvPicPr>
-        <p:blipFill rotWithShape="1">
-          <a:blip r:embed="rId2" cstate="print">
+        </p:nvGrpSpPr>
+        <p:grpSpPr>
+          <a:xfrm>
+            <a:off x="1212850" y="311150"/>
+            <a:ext cx="7784327" cy="4089400"/>
+            <a:chOff x="1212850" y="311150"/>
+            <a:chExt cx="7784327" cy="4089400"/>
+          </a:xfrm>
+        </p:grpSpPr>
+        <p:pic>
+          <p:nvPicPr>
+            <p:cNvPr id="1026" name="Picture 2" descr="Z:\Documents\CMB-Probe\SPIE_June2018\optics_paper\zrn_rays_45cmY.png"/>
+            <p:cNvPicPr>
+              <a:picLocks noChangeAspect="1" noChangeArrowheads="1"/>
+            </p:cNvPicPr>
+            <p:nvPr/>
+          </p:nvPicPr>
+          <p:blipFill rotWithShape="1">
+            <a:blip r:embed="rId2" cstate="print">
+              <a:extLst>
+                <a:ext uri="{28A0092B-C50C-407E-A947-70E740481C1C}">
+                  <a14:useLocalDpi xmlns:a14="http://schemas.microsoft.com/office/drawing/2010/main" val="0"/>
+                </a:ext>
+              </a:extLst>
+            </a:blip>
+            <a:srcRect l="27480" t="2876" r="28337" b="8983"/>
+            <a:stretch/>
+          </p:blipFill>
+          <p:spPr bwMode="auto">
+            <a:xfrm>
+              <a:off x="1612901" y="311150"/>
+              <a:ext cx="2838450" cy="3987800"/>
+            </a:xfrm>
+            <a:prstGeom prst="rect">
+              <a:avLst/>
+            </a:prstGeom>
+            <a:noFill/>
             <a:extLst>
-              <a:ext uri="{28A0092B-C50C-407E-A947-70E740481C1C}">
-                <a14:useLocalDpi xmlns:a14="http://schemas.microsoft.com/office/drawing/2010/main" val="0"/>
+              <a:ext uri="{909E8E84-426E-40DD-AFC4-6F175D3DCCD1}">
+                <a14:hiddenFill xmlns:a14="http://schemas.microsoft.com/office/drawing/2010/main">
+                  <a:solidFill>
+                    <a:srgbClr val="FFFFFF"/>
+                  </a:solidFill>
+                </a14:hiddenFill>
               </a:ext>
             </a:extLst>
-          </a:blip>
-          <a:srcRect l="27480" t="2876" r="28337" b="8983"/>
-          <a:stretch/>
-        </p:blipFill>
-        <p:spPr bwMode="auto">
-          <a:xfrm>
-            <a:off x="1612901" y="311150"/>
-            <a:ext cx="2838450" cy="3987800"/>
-          </a:xfrm>
-          <a:prstGeom prst="rect">
-            <a:avLst/>
-          </a:prstGeom>
-          <a:noFill/>
-          <a:extLst>
-            <a:ext uri="{909E8E84-426E-40DD-AFC4-6F175D3DCCD1}">
-              <a14:hiddenFill xmlns:a14="http://schemas.microsoft.com/office/drawing/2010/main">
-                <a:solidFill>
-                  <a:srgbClr val="FFFFFF"/>
-                </a:solidFill>
-              </a14:hiddenFill>
-            </a:ext>
-          </a:extLst>
-        </p:spPr>
-      </p:pic>
-      <p:sp>
-        <p:nvSpPr>
-          <p:cNvPr id="3" name="TextBox 2">
+          </p:spPr>
+        </p:pic>
+        <p:sp>
+          <p:nvSpPr>
+            <p:cNvPr id="3" name="TextBox 2">
+              <a:extLst>
+                <a:ext uri="{FF2B5EF4-FFF2-40B4-BE49-F238E27FC236}">
+                  <a16:creationId xmlns="" xmlns:a16="http://schemas.microsoft.com/office/drawing/2014/main" id="{E4756D17-1F3F-E64B-AB67-230A59782D9A}"/>
+                </a:ext>
+              </a:extLst>
+            </p:cNvPr>
+            <p:cNvSpPr txBox="1"/>
+            <p:nvPr/>
+          </p:nvSpPr>
+          <p:spPr>
+            <a:xfrm>
+              <a:off x="1219200" y="2810530"/>
+              <a:ext cx="1219200" cy="523220"/>
+            </a:xfrm>
+            <a:prstGeom prst="rect">
+              <a:avLst/>
+            </a:prstGeom>
+            <a:noFill/>
+            <a:ln>
+              <a:noFill/>
+            </a:ln>
+          </p:spPr>
+          <p:txBody>
+            <a:bodyPr wrap="square" rtlCol="0">
+              <a:spAutoFit/>
+            </a:bodyPr>
+            <a:lstStyle/>
+            <a:p>
+              <a:pPr algn="ctr"/>
+              <a:r>
+                <a:rPr lang="en-US" sz="1400" dirty="0"/>
+                <a:t>Focal </a:t>
+              </a:r>
+              <a:r>
+                <a:rPr lang="en-US" sz="1400" dirty="0" smtClean="0"/>
+                <a:t>Plane, 100 </a:t>
+              </a:r>
+              <a:r>
+                <a:rPr lang="en-US" sz="1400" dirty="0" err="1" smtClean="0"/>
+                <a:t>mK</a:t>
+              </a:r>
+              <a:endParaRPr lang="en-US" sz="1400" dirty="0"/>
+            </a:p>
+          </p:txBody>
+        </p:sp>
+        <p:sp>
+          <p:nvSpPr>
+            <p:cNvPr id="4" name="TextBox 3">
+              <a:extLst>
+                <a:ext uri="{FF2B5EF4-FFF2-40B4-BE49-F238E27FC236}">
+                  <a16:creationId xmlns="" xmlns:a16="http://schemas.microsoft.com/office/drawing/2014/main" id="{E4756D17-1F3F-E64B-AB67-230A59782D9A}"/>
+                </a:ext>
+              </a:extLst>
+            </p:cNvPr>
+            <p:cNvSpPr txBox="1"/>
+            <p:nvPr/>
+          </p:nvSpPr>
+          <p:spPr>
+            <a:xfrm>
+              <a:off x="3200400" y="4092773"/>
+              <a:ext cx="1371600" cy="307777"/>
+            </a:xfrm>
+            <a:prstGeom prst="rect">
+              <a:avLst/>
+            </a:prstGeom>
+            <a:noFill/>
+            <a:ln>
+              <a:noFill/>
+            </a:ln>
+          </p:spPr>
+          <p:txBody>
+            <a:bodyPr wrap="square" rtlCol="0">
+              <a:spAutoFit/>
+            </a:bodyPr>
+            <a:lstStyle/>
+            <a:p>
+              <a:pPr algn="ctr"/>
+              <a:r>
+                <a:rPr lang="en-US" sz="1400" dirty="0" smtClean="0"/>
+                <a:t>Secondary, 4 K</a:t>
+              </a:r>
+              <a:endParaRPr lang="en-US" sz="1400" dirty="0"/>
+            </a:p>
+          </p:txBody>
+        </p:sp>
+        <p:cxnSp>
+          <p:nvCxnSpPr>
+            <p:cNvPr id="5" name="Straight Arrow Connector 4"/>
+            <p:cNvCxnSpPr/>
+            <p:nvPr/>
+          </p:nvCxnSpPr>
+          <p:spPr>
+            <a:xfrm>
+              <a:off x="1676400" y="4019550"/>
+              <a:ext cx="523875" cy="0"/>
+            </a:xfrm>
+            <a:prstGeom prst="straightConnector1">
+              <a:avLst/>
+            </a:prstGeom>
+            <a:ln w="12700">
+              <a:headEnd type="triangle" w="sm" len="sm"/>
+              <a:tailEnd type="triangle" w="sm" len="sm"/>
+            </a:ln>
+            <a:effectLst/>
+          </p:spPr>
+          <p:style>
+            <a:lnRef idx="2">
+              <a:schemeClr val="dk1"/>
+            </a:lnRef>
+            <a:fillRef idx="0">
+              <a:schemeClr val="dk1"/>
+            </a:fillRef>
+            <a:effectRef idx="1">
+              <a:schemeClr val="dk1"/>
+            </a:effectRef>
+            <a:fontRef idx="minor">
+              <a:schemeClr val="tx1"/>
+            </a:fontRef>
+          </p:style>
+        </p:cxnSp>
+        <p:sp>
+          <p:nvSpPr>
+            <p:cNvPr id="11" name="TextBox 10">
+              <a:extLst>
+                <a:ext uri="{FF2B5EF4-FFF2-40B4-BE49-F238E27FC236}">
+                  <a16:creationId xmlns="" xmlns:a16="http://schemas.microsoft.com/office/drawing/2014/main" id="{E4756D17-1F3F-E64B-AB67-230A59782D9A}"/>
+                </a:ext>
+              </a:extLst>
+            </p:cNvPr>
+            <p:cNvSpPr txBox="1"/>
+            <p:nvPr/>
+          </p:nvSpPr>
+          <p:spPr>
+            <a:xfrm>
+              <a:off x="1270000" y="3991173"/>
+              <a:ext cx="1371600" cy="261610"/>
+            </a:xfrm>
+            <a:prstGeom prst="rect">
+              <a:avLst/>
+            </a:prstGeom>
+            <a:noFill/>
+            <a:ln>
+              <a:noFill/>
+            </a:ln>
+          </p:spPr>
+          <p:txBody>
+            <a:bodyPr wrap="square" rtlCol="0">
+              <a:spAutoFit/>
+            </a:bodyPr>
+            <a:lstStyle/>
+            <a:p>
+              <a:pPr algn="ctr"/>
+              <a:r>
+                <a:rPr lang="en-US" sz="1100" dirty="0" smtClean="0"/>
+                <a:t>50 cm</a:t>
+              </a:r>
+              <a:endParaRPr lang="en-US" sz="1100" dirty="0"/>
+            </a:p>
+          </p:txBody>
+        </p:sp>
+        <p:sp>
+          <p:nvSpPr>
+            <p:cNvPr id="12" name="TextBox 11">
+              <a:extLst>
+                <a:ext uri="{FF2B5EF4-FFF2-40B4-BE49-F238E27FC236}">
+                  <a16:creationId xmlns="" xmlns:a16="http://schemas.microsoft.com/office/drawing/2014/main" id="{E4756D17-1F3F-E64B-AB67-230A59782D9A}"/>
+                </a:ext>
+              </a:extLst>
+            </p:cNvPr>
+            <p:cNvSpPr txBox="1"/>
+            <p:nvPr/>
+          </p:nvSpPr>
+          <p:spPr>
+            <a:xfrm>
+              <a:off x="1212850" y="2077760"/>
+              <a:ext cx="1143000" cy="523220"/>
+            </a:xfrm>
+            <a:prstGeom prst="rect">
+              <a:avLst/>
+            </a:prstGeom>
+            <a:noFill/>
+            <a:ln>
+              <a:noFill/>
+            </a:ln>
+          </p:spPr>
+          <p:txBody>
+            <a:bodyPr wrap="square" rtlCol="0">
+              <a:spAutoFit/>
+            </a:bodyPr>
+            <a:lstStyle/>
+            <a:p>
+              <a:pPr algn="ctr"/>
+              <a:r>
+                <a:rPr lang="en-US" sz="1400" dirty="0" smtClean="0"/>
+                <a:t>Aperture </a:t>
+              </a:r>
+            </a:p>
+            <a:p>
+              <a:pPr algn="ctr"/>
+              <a:r>
+                <a:rPr lang="en-US" sz="1400" dirty="0" smtClean="0"/>
+                <a:t>Stop, 4 K</a:t>
+              </a:r>
+              <a:endParaRPr lang="en-US" sz="1400" dirty="0"/>
+            </a:p>
+          </p:txBody>
+        </p:sp>
+        <p:sp>
+          <p:nvSpPr>
+            <p:cNvPr id="13" name="TextBox 12">
+              <a:extLst>
+                <a:ext uri="{FF2B5EF4-FFF2-40B4-BE49-F238E27FC236}">
+                  <a16:creationId xmlns="" xmlns:a16="http://schemas.microsoft.com/office/drawing/2014/main" id="{E4756D17-1F3F-E64B-AB67-230A59782D9A}"/>
+                </a:ext>
+              </a:extLst>
+            </p:cNvPr>
+            <p:cNvSpPr txBox="1"/>
+            <p:nvPr/>
+          </p:nvSpPr>
+          <p:spPr>
+            <a:xfrm>
+              <a:off x="2819400" y="666750"/>
+              <a:ext cx="1371600" cy="307777"/>
+            </a:xfrm>
+            <a:prstGeom prst="rect">
+              <a:avLst/>
+            </a:prstGeom>
+            <a:noFill/>
+            <a:ln>
+              <a:noFill/>
+            </a:ln>
+          </p:spPr>
+          <p:txBody>
+            <a:bodyPr wrap="square" rtlCol="0">
+              <a:spAutoFit/>
+            </a:bodyPr>
+            <a:lstStyle/>
+            <a:p>
+              <a:pPr algn="ctr"/>
+              <a:r>
+                <a:rPr lang="en-US" sz="1400" dirty="0" smtClean="0"/>
+                <a:t>Primary, 40 K</a:t>
+              </a:r>
+              <a:endParaRPr lang="en-US" sz="1400" dirty="0"/>
+            </a:p>
+          </p:txBody>
+        </p:sp>
+        <p:pic>
+          <p:nvPicPr>
+            <p:cNvPr id="1027" name="Picture 3"/>
+            <p:cNvPicPr>
+              <a:picLocks noChangeAspect="1" noChangeArrowheads="1"/>
+            </p:cNvPicPr>
+            <p:nvPr/>
+          </p:nvPicPr>
+          <p:blipFill>
+            <a:blip r:embed="rId3" cstate="print">
+              <a:extLst>
+                <a:ext uri="{28A0092B-C50C-407E-A947-70E740481C1C}">
+                  <a14:useLocalDpi xmlns:a14="http://schemas.microsoft.com/office/drawing/2010/main" val="0"/>
+                </a:ext>
+              </a:extLst>
+            </a:blip>
+            <a:stretch>
+              <a:fillRect/>
+            </a:stretch>
+          </p:blipFill>
+          <p:spPr bwMode="auto">
+            <a:xfrm>
+              <a:off x="4724400" y="969458"/>
+              <a:ext cx="4272777" cy="3204582"/>
+            </a:xfrm>
+            <a:prstGeom prst="rect">
+              <a:avLst/>
+            </a:prstGeom>
+            <a:noFill/>
             <a:extLst>
-              <a:ext uri="{FF2B5EF4-FFF2-40B4-BE49-F238E27FC236}">
-                <a16:creationId xmlns:a16="http://schemas.microsoft.com/office/drawing/2014/main" xmlns="" id="{E4756D17-1F3F-E64B-AB67-230A59782D9A}"/>
+              <a:ext uri="{909E8E84-426E-40DD-AFC4-6F175D3DCCD1}">
+                <a14:hiddenFill xmlns:a14="http://schemas.microsoft.com/office/drawing/2010/main">
+                  <a:solidFill>
+                    <a:srgbClr val="FFFFFF"/>
+                  </a:solidFill>
+                </a14:hiddenFill>
               </a:ext>
             </a:extLst>
-          </p:cNvPr>
-          <p:cNvSpPr txBox="1"/>
-          <p:nvPr/>
-        </p:nvSpPr>
-        <p:spPr>
-          <a:xfrm>
-            <a:off x="1219200" y="2810530"/>
-            <a:ext cx="1219200" cy="523220"/>
-          </a:xfrm>
-          <a:prstGeom prst="rect">
-            <a:avLst/>
-          </a:prstGeom>
-          <a:noFill/>
-          <a:ln>
-            <a:noFill/>
-          </a:ln>
-        </p:spPr>
-        <p:txBody>
-          <a:bodyPr wrap="square" rtlCol="0">
-            <a:spAutoFit/>
-          </a:bodyPr>
-          <a:lstStyle/>
-          <a:p>
-            <a:pPr algn="ctr"/>
-            <a:r>
-              <a:rPr lang="en-US" sz="1400" dirty="0"/>
-              <a:t>Focal </a:t>
-            </a:r>
-            <a:r>
-              <a:rPr lang="en-US" sz="1400" dirty="0" smtClean="0"/>
-              <a:t>Plane, 100 </a:t>
-            </a:r>
-            <a:r>
-              <a:rPr lang="en-US" sz="1400" dirty="0" err="1" smtClean="0"/>
-              <a:t>mK</a:t>
-            </a:r>
-            <a:endParaRPr lang="en-US" sz="1400" dirty="0"/>
-          </a:p>
-        </p:txBody>
-      </p:sp>
-      <p:sp>
-        <p:nvSpPr>
-          <p:cNvPr id="4" name="TextBox 3">
-            <a:extLst>
-              <a:ext uri="{FF2B5EF4-FFF2-40B4-BE49-F238E27FC236}">
-                <a16:creationId xmlns:a16="http://schemas.microsoft.com/office/drawing/2014/main" xmlns="" id="{E4756D17-1F3F-E64B-AB67-230A59782D9A}"/>
-              </a:ext>
-            </a:extLst>
-          </p:cNvPr>
-          <p:cNvSpPr txBox="1"/>
-          <p:nvPr/>
-        </p:nvSpPr>
-        <p:spPr>
-          <a:xfrm>
-            <a:off x="3200400" y="4092773"/>
-            <a:ext cx="1371600" cy="307777"/>
-          </a:xfrm>
-          <a:prstGeom prst="rect">
-            <a:avLst/>
-          </a:prstGeom>
-          <a:noFill/>
-          <a:ln>
-            <a:noFill/>
-          </a:ln>
-        </p:spPr>
-        <p:txBody>
-          <a:bodyPr wrap="square" rtlCol="0">
-            <a:spAutoFit/>
-          </a:bodyPr>
-          <a:lstStyle/>
-          <a:p>
-            <a:pPr algn="ctr"/>
-            <a:r>
-              <a:rPr lang="en-US" sz="1400" dirty="0" smtClean="0"/>
-              <a:t>Secondary, 4 K</a:t>
-            </a:r>
-            <a:endParaRPr lang="en-US" sz="1400" dirty="0"/>
-          </a:p>
-        </p:txBody>
-      </p:sp>
-      <p:cxnSp>
-        <p:nvCxnSpPr>
-          <p:cNvPr id="5" name="Straight Arrow Connector 4"/>
-          <p:cNvCxnSpPr/>
-          <p:nvPr/>
-        </p:nvCxnSpPr>
-        <p:spPr>
-          <a:xfrm>
-            <a:off x="1676400" y="4019550"/>
-            <a:ext cx="523875" cy="0"/>
-          </a:xfrm>
-          <a:prstGeom prst="straightConnector1">
-            <a:avLst/>
-          </a:prstGeom>
-          <a:ln w="12700">
-            <a:headEnd type="triangle" w="sm" len="sm"/>
-            <a:tailEnd type="triangle" w="sm" len="sm"/>
-          </a:ln>
-          <a:effectLst/>
-        </p:spPr>
-        <p:style>
-          <a:lnRef idx="2">
-            <a:schemeClr val="dk1"/>
-          </a:lnRef>
-          <a:fillRef idx="0">
-            <a:schemeClr val="dk1"/>
-          </a:fillRef>
-          <a:effectRef idx="1">
-            <a:schemeClr val="dk1"/>
-          </a:effectRef>
-          <a:fontRef idx="minor">
-            <a:schemeClr val="tx1"/>
-          </a:fontRef>
-        </p:style>
-      </p:cxnSp>
-      <p:sp>
-        <p:nvSpPr>
-          <p:cNvPr id="11" name="TextBox 10">
-            <a:extLst>
-              <a:ext uri="{FF2B5EF4-FFF2-40B4-BE49-F238E27FC236}">
-                <a16:creationId xmlns:a16="http://schemas.microsoft.com/office/drawing/2014/main" xmlns="" id="{E4756D17-1F3F-E64B-AB67-230A59782D9A}"/>
-              </a:ext>
-            </a:extLst>
-          </p:cNvPr>
-          <p:cNvSpPr txBox="1"/>
-          <p:nvPr/>
-        </p:nvSpPr>
-        <p:spPr>
-          <a:xfrm>
-            <a:off x="1270000" y="3991173"/>
-            <a:ext cx="1371600" cy="261610"/>
-          </a:xfrm>
-          <a:prstGeom prst="rect">
-            <a:avLst/>
-          </a:prstGeom>
-          <a:noFill/>
-          <a:ln>
-            <a:noFill/>
-          </a:ln>
-        </p:spPr>
-        <p:txBody>
-          <a:bodyPr wrap="square" rtlCol="0">
-            <a:spAutoFit/>
-          </a:bodyPr>
-          <a:lstStyle/>
-          <a:p>
-            <a:pPr algn="ctr"/>
-            <a:r>
-              <a:rPr lang="en-US" sz="1100" dirty="0" smtClean="0"/>
-              <a:t>50 cm</a:t>
-            </a:r>
-            <a:endParaRPr lang="en-US" sz="1100" dirty="0"/>
-          </a:p>
-        </p:txBody>
-      </p:sp>
-      <p:sp>
-        <p:nvSpPr>
-          <p:cNvPr id="12" name="TextBox 11">
-            <a:extLst>
-              <a:ext uri="{FF2B5EF4-FFF2-40B4-BE49-F238E27FC236}">
-                <a16:creationId xmlns:a16="http://schemas.microsoft.com/office/drawing/2014/main" xmlns="" id="{E4756D17-1F3F-E64B-AB67-230A59782D9A}"/>
-              </a:ext>
-            </a:extLst>
-          </p:cNvPr>
-          <p:cNvSpPr txBox="1"/>
-          <p:nvPr/>
-        </p:nvSpPr>
-        <p:spPr>
-          <a:xfrm>
-            <a:off x="1212850" y="2077760"/>
-            <a:ext cx="1143000" cy="523220"/>
-          </a:xfrm>
-          <a:prstGeom prst="rect">
-            <a:avLst/>
-          </a:prstGeom>
-          <a:noFill/>
-          <a:ln>
-            <a:noFill/>
-          </a:ln>
-        </p:spPr>
-        <p:txBody>
-          <a:bodyPr wrap="square" rtlCol="0">
-            <a:spAutoFit/>
-          </a:bodyPr>
-          <a:lstStyle/>
-          <a:p>
-            <a:pPr algn="ctr"/>
-            <a:r>
-              <a:rPr lang="en-US" sz="1400" dirty="0" smtClean="0"/>
-              <a:t>Aperture </a:t>
-            </a:r>
-          </a:p>
-          <a:p>
-            <a:pPr algn="ctr"/>
-            <a:r>
-              <a:rPr lang="en-US" sz="1400" dirty="0" smtClean="0"/>
-              <a:t>Stop, 4 K</a:t>
-            </a:r>
-            <a:endParaRPr lang="en-US" sz="1400" dirty="0"/>
-          </a:p>
-        </p:txBody>
-      </p:sp>
-      <p:sp>
-        <p:nvSpPr>
-          <p:cNvPr id="13" name="TextBox 12">
-            <a:extLst>
-              <a:ext uri="{FF2B5EF4-FFF2-40B4-BE49-F238E27FC236}">
-                <a16:creationId xmlns:a16="http://schemas.microsoft.com/office/drawing/2014/main" xmlns="" id="{E4756D17-1F3F-E64B-AB67-230A59782D9A}"/>
-              </a:ext>
-            </a:extLst>
-          </p:cNvPr>
-          <p:cNvSpPr txBox="1"/>
-          <p:nvPr/>
-        </p:nvSpPr>
-        <p:spPr>
-          <a:xfrm>
-            <a:off x="2819400" y="666750"/>
-            <a:ext cx="1371600" cy="307777"/>
-          </a:xfrm>
-          <a:prstGeom prst="rect">
-            <a:avLst/>
-          </a:prstGeom>
-          <a:noFill/>
-          <a:ln>
-            <a:noFill/>
-          </a:ln>
-        </p:spPr>
-        <p:txBody>
-          <a:bodyPr wrap="square" rtlCol="0">
-            <a:spAutoFit/>
-          </a:bodyPr>
-          <a:lstStyle/>
-          <a:p>
-            <a:pPr algn="ctr"/>
-            <a:r>
-              <a:rPr lang="en-US" sz="1400" dirty="0" smtClean="0"/>
-              <a:t>Primary, 40 K</a:t>
-            </a:r>
-            <a:endParaRPr lang="en-US" sz="1400" dirty="0"/>
-          </a:p>
-        </p:txBody>
-      </p:sp>
-      <p:pic>
-        <p:nvPicPr>
-          <p:cNvPr id="1027" name="Picture 3" descr="Z:\Documents\CMB-Probe\optics_strehls\output\jpl_zrn_OpenDragone_comp.png"/>
-          <p:cNvPicPr>
-            <a:picLocks noChangeAspect="1" noChangeArrowheads="1"/>
-          </p:cNvPicPr>
-          <p:nvPr/>
-        </p:nvPicPr>
-        <p:blipFill>
-          <a:blip r:embed="rId3">
-            <a:extLst>
-              <a:ext uri="{28A0092B-C50C-407E-A947-70E740481C1C}">
-                <a14:useLocalDpi xmlns:a14="http://schemas.microsoft.com/office/drawing/2010/main" val="0"/>
-              </a:ext>
-            </a:extLst>
-          </a:blip>
-          <a:srcRect/>
-          <a:stretch>
-            <a:fillRect/>
-          </a:stretch>
-        </p:blipFill>
-        <p:spPr bwMode="auto">
-          <a:xfrm>
-            <a:off x="4724400" y="969168"/>
-            <a:ext cx="4272777" cy="3205163"/>
-          </a:xfrm>
-          <a:prstGeom prst="rect">
-            <a:avLst/>
-          </a:prstGeom>
-          <a:noFill/>
-          <a:extLst>
-            <a:ext uri="{909E8E84-426E-40DD-AFC4-6F175D3DCCD1}">
-              <a14:hiddenFill xmlns:a14="http://schemas.microsoft.com/office/drawing/2010/main">
-                <a:solidFill>
-                  <a:srgbClr val="FFFFFF"/>
-                </a:solidFill>
-              </a14:hiddenFill>
-            </a:ext>
-          </a:extLst>
-        </p:spPr>
-      </p:pic>
-      <p:cxnSp>
-        <p:nvCxnSpPr>
-          <p:cNvPr id="15" name="Straight Arrow Connector 14">
-            <a:extLst>
-              <a:ext uri="{FF2B5EF4-FFF2-40B4-BE49-F238E27FC236}">
-                <a16:creationId xmlns:a16="http://schemas.microsoft.com/office/drawing/2014/main" xmlns="" id="{F27EDF7D-9821-124F-BFAC-296397795C0B}"/>
-              </a:ext>
-            </a:extLst>
-          </p:cNvPr>
-          <p:cNvCxnSpPr>
-            <a:cxnSpLocks/>
-          </p:cNvCxnSpPr>
-          <p:nvPr/>
-        </p:nvCxnSpPr>
-        <p:spPr>
-          <a:xfrm>
-            <a:off x="2200275" y="2419350"/>
-            <a:ext cx="672465" cy="361950"/>
-          </a:xfrm>
-          <a:prstGeom prst="straightConnector1">
-            <a:avLst/>
-          </a:prstGeom>
-          <a:ln w="12700">
-            <a:solidFill>
+          </p:spPr>
+        </p:pic>
+        <p:cxnSp>
+          <p:nvCxnSpPr>
+            <p:cNvPr id="15" name="Straight Arrow Connector 14">
+              <a:extLst>
+                <a:ext uri="{FF2B5EF4-FFF2-40B4-BE49-F238E27FC236}">
+                  <a16:creationId xmlns="" xmlns:a16="http://schemas.microsoft.com/office/drawing/2014/main" id="{F27EDF7D-9821-124F-BFAC-296397795C0B}"/>
+                </a:ext>
+              </a:extLst>
+            </p:cNvPr>
+            <p:cNvCxnSpPr>
+              <a:cxnSpLocks/>
+            </p:cNvCxnSpPr>
+            <p:nvPr/>
+          </p:nvCxnSpPr>
+          <p:spPr>
+            <a:xfrm>
+              <a:off x="2200275" y="2419350"/>
+              <a:ext cx="672465" cy="361950"/>
+            </a:xfrm>
+            <a:prstGeom prst="straightConnector1">
+              <a:avLst/>
+            </a:prstGeom>
+            <a:ln w="12700">
+              <a:solidFill>
+                <a:schemeClr val="tx1"/>
+              </a:solidFill>
+              <a:headEnd type="none" w="med" len="med"/>
+              <a:tailEnd type="arrow" w="med" len="med"/>
+            </a:ln>
+          </p:spPr>
+          <p:style>
+            <a:lnRef idx="1">
+              <a:schemeClr val="accent1"/>
+            </a:lnRef>
+            <a:fillRef idx="0">
+              <a:schemeClr val="accent1"/>
+            </a:fillRef>
+            <a:effectRef idx="0">
+              <a:schemeClr val="accent1"/>
+            </a:effectRef>
+            <a:fontRef idx="minor">
               <a:schemeClr val="tx1"/>
-            </a:solidFill>
-            <a:headEnd type="none" w="med" len="med"/>
-            <a:tailEnd type="arrow" w="med" len="med"/>
-          </a:ln>
-        </p:spPr>
-        <p:style>
-          <a:lnRef idx="1">
-            <a:schemeClr val="accent1"/>
-          </a:lnRef>
-          <a:fillRef idx="0">
-            <a:schemeClr val="accent1"/>
-          </a:fillRef>
-          <a:effectRef idx="0">
-            <a:schemeClr val="accent1"/>
-          </a:effectRef>
-          <a:fontRef idx="minor">
-            <a:schemeClr val="tx1"/>
-          </a:fontRef>
-        </p:style>
-      </p:cxnSp>
+            </a:fontRef>
+          </p:style>
+        </p:cxnSp>
+      </p:grpSp>
     </p:spTree>
     <p:extLst>
       <p:ext uri="{BB962C8B-B14F-4D97-AF65-F5344CB8AC3E}">
@@ -3515,40 +3527,182 @@
           <a:chExt cx="0" cy="0"/>
         </a:xfrm>
       </p:grpSpPr>
+      <p:grpSp>
+        <p:nvGrpSpPr>
+          <p:cNvPr id="6" name="Group 5"/>
+          <p:cNvGrpSpPr/>
+          <p:nvPr/>
+        </p:nvGrpSpPr>
+        <p:grpSpPr>
+          <a:xfrm>
+            <a:off x="1703404" y="361950"/>
+            <a:ext cx="7293772" cy="3860800"/>
+            <a:chOff x="1703404" y="361950"/>
+            <a:chExt cx="7293772" cy="3860800"/>
+          </a:xfrm>
+        </p:grpSpPr>
+        <p:pic>
+          <p:nvPicPr>
+            <p:cNvPr id="1026" name="Picture 2"/>
+            <p:cNvPicPr>
+              <a:picLocks noChangeAspect="1" noChangeArrowheads="1"/>
+            </p:cNvPicPr>
+            <p:nvPr/>
+          </p:nvPicPr>
+          <p:blipFill>
+            <a:blip r:embed="rId2" cstate="print">
+              <a:extLst>
+                <a:ext uri="{28A0092B-C50C-407E-A947-70E740481C1C}">
+                  <a14:useLocalDpi xmlns:a14="http://schemas.microsoft.com/office/drawing/2010/main" val="0"/>
+                </a:ext>
+              </a:extLst>
+            </a:blip>
+            <a:stretch>
+              <a:fillRect/>
+            </a:stretch>
+          </p:blipFill>
+          <p:spPr bwMode="auto">
+            <a:xfrm>
+              <a:off x="1703404" y="361950"/>
+              <a:ext cx="2747831" cy="3860800"/>
+            </a:xfrm>
+            <a:prstGeom prst="rect">
+              <a:avLst/>
+            </a:prstGeom>
+            <a:noFill/>
+            <a:extLst>
+              <a:ext uri="{909E8E84-426E-40DD-AFC4-6F175D3DCCD1}">
+                <a14:hiddenFill xmlns:a14="http://schemas.microsoft.com/office/drawing/2010/main">
+                  <a:solidFill>
+                    <a:srgbClr val="FFFFFF"/>
+                  </a:solidFill>
+                </a14:hiddenFill>
+              </a:ext>
+            </a:extLst>
+          </p:spPr>
+        </p:pic>
+        <p:cxnSp>
+          <p:nvCxnSpPr>
+            <p:cNvPr id="5" name="Straight Arrow Connector 4"/>
+            <p:cNvCxnSpPr/>
+            <p:nvPr/>
+          </p:nvCxnSpPr>
+          <p:spPr>
+            <a:xfrm flipV="1">
+              <a:off x="1912938" y="3714750"/>
+              <a:ext cx="511175" cy="3175"/>
+            </a:xfrm>
+            <a:prstGeom prst="straightConnector1">
+              <a:avLst/>
+            </a:prstGeom>
+            <a:ln w="12700">
+              <a:headEnd type="triangle" w="sm" len="sm"/>
+              <a:tailEnd type="triangle" w="sm" len="sm"/>
+            </a:ln>
+            <a:effectLst/>
+          </p:spPr>
+          <p:style>
+            <a:lnRef idx="2">
+              <a:schemeClr val="dk1"/>
+            </a:lnRef>
+            <a:fillRef idx="0">
+              <a:schemeClr val="dk1"/>
+            </a:fillRef>
+            <a:effectRef idx="1">
+              <a:schemeClr val="dk1"/>
+            </a:effectRef>
+            <a:fontRef idx="minor">
+              <a:schemeClr val="tx1"/>
+            </a:fontRef>
+          </p:style>
+        </p:cxnSp>
+        <p:sp>
+          <p:nvSpPr>
+            <p:cNvPr id="11" name="TextBox 10">
+              <a:extLst>
+                <a:ext uri="{FF2B5EF4-FFF2-40B4-BE49-F238E27FC236}">
+                  <a16:creationId xmlns="" xmlns:a16="http://schemas.microsoft.com/office/drawing/2014/main" id="{E4756D17-1F3F-E64B-AB67-230A59782D9A}"/>
+                </a:ext>
+              </a:extLst>
+            </p:cNvPr>
+            <p:cNvSpPr txBox="1"/>
+            <p:nvPr/>
+          </p:nvSpPr>
+          <p:spPr>
+            <a:xfrm>
+              <a:off x="1822450" y="3753680"/>
+              <a:ext cx="692150" cy="261610"/>
+            </a:xfrm>
+            <a:prstGeom prst="rect">
+              <a:avLst/>
+            </a:prstGeom>
+            <a:solidFill>
+              <a:schemeClr val="bg1"/>
+            </a:solidFill>
+            <a:ln>
+              <a:noFill/>
+            </a:ln>
+          </p:spPr>
+          <p:txBody>
+            <a:bodyPr wrap="square" rtlCol="0">
+              <a:spAutoFit/>
+            </a:bodyPr>
+            <a:lstStyle/>
+            <a:p>
+              <a:pPr algn="ctr"/>
+              <a:r>
+                <a:rPr lang="en-US" sz="1100" dirty="0" smtClean="0"/>
+                <a:t>50 cm</a:t>
+              </a:r>
+              <a:endParaRPr lang="en-US" sz="1100" dirty="0"/>
+            </a:p>
+          </p:txBody>
+        </p:sp>
+        <p:pic>
+          <p:nvPicPr>
+            <p:cNvPr id="1027" name="Picture 3"/>
+            <p:cNvPicPr>
+              <a:picLocks noChangeAspect="1" noChangeArrowheads="1"/>
+            </p:cNvPicPr>
+            <p:nvPr/>
+          </p:nvPicPr>
+          <p:blipFill>
+            <a:blip r:embed="rId3" cstate="print">
+              <a:extLst>
+                <a:ext uri="{28A0092B-C50C-407E-A947-70E740481C1C}">
+                  <a14:useLocalDpi xmlns:a14="http://schemas.microsoft.com/office/drawing/2010/main" val="0"/>
+                </a:ext>
+              </a:extLst>
+            </a:blip>
+            <a:stretch>
+              <a:fillRect/>
+            </a:stretch>
+          </p:blipFill>
+          <p:spPr bwMode="auto">
+            <a:xfrm>
+              <a:off x="4724400" y="969458"/>
+              <a:ext cx="4272776" cy="3204582"/>
+            </a:xfrm>
+            <a:prstGeom prst="rect">
+              <a:avLst/>
+            </a:prstGeom>
+            <a:noFill/>
+            <a:extLst>
+              <a:ext uri="{909E8E84-426E-40DD-AFC4-6F175D3DCCD1}">
+                <a14:hiddenFill xmlns:a14="http://schemas.microsoft.com/office/drawing/2010/main">
+                  <a:solidFill>
+                    <a:srgbClr val="FFFFFF"/>
+                  </a:solidFill>
+                </a14:hiddenFill>
+              </a:ext>
+            </a:extLst>
+          </p:spPr>
+        </p:pic>
+      </p:grpSp>
     </p:spTree>
     <p:extLst>
       <p:ext uri="{BB962C8B-B14F-4D97-AF65-F5344CB8AC3E}">
-        <p14:creationId xmlns:p14="http://schemas.microsoft.com/office/powerpoint/2010/main" val="3694570211"/>
-      </p:ext>
-    </p:extLst>
-  </p:cSld>
-  <p:clrMapOvr>
-    <a:masterClrMapping/>
-  </p:clrMapOvr>
-</p:sld>
-</file>
-
-<file path=ppt/slides/slide3.xml><?xml version="1.0" encoding="utf-8"?>
-<p:sld xmlns:a="http://schemas.openxmlformats.org/drawingml/2006/main" xmlns:r="http://schemas.openxmlformats.org/officeDocument/2006/relationships" xmlns:p="http://schemas.openxmlformats.org/presentationml/2006/main">
-  <p:cSld>
-    <p:spTree>
-      <p:nvGrpSpPr>
-        <p:cNvPr id="1" name=""/>
-        <p:cNvGrpSpPr/>
-        <p:nvPr/>
-      </p:nvGrpSpPr>
-      <p:grpSpPr>
-        <a:xfrm>
-          <a:off x="0" y="0"/>
-          <a:ext cx="0" cy="0"/>
-          <a:chOff x="0" y="0"/>
-          <a:chExt cx="0" cy="0"/>
-        </a:xfrm>
-      </p:grpSpPr>
-    </p:spTree>
-    <p:extLst>
-      <p:ext uri="{BB962C8B-B14F-4D97-AF65-F5344CB8AC3E}">
-        <p14:creationId xmlns:p14="http://schemas.microsoft.com/office/powerpoint/2010/main" val="896019220"/>
+        <p14:creationId xmlns:p14="http://schemas.microsoft.com/office/powerpoint/2010/main" val="3290424354"/>
       </p:ext>
     </p:extLst>
   </p:cSld>

</xml_diff>